<commit_message>
old v new slide added
design choice due to original space for regular rectagular mapping added
</commit_message>
<xml_diff>
--- a/solutionNaveshKumarDataScientist.pptx
+++ b/solutionNaveshKumarDataScientist.pptx
@@ -132,7 +132,7 @@
   <pc:docChgLst>
     <pc:chgData name="Navesh Kumar" userId="3ebf9d26fca90b3a" providerId="LiveId" clId="{4C3D355F-0E91-4912-A721-AAA505D0F553}"/>
     <pc:docChg chg="undo custSel addSld delSld modSld sldOrd modMainMaster">
-      <pc:chgData name="Navesh Kumar" userId="3ebf9d26fca90b3a" providerId="LiveId" clId="{4C3D355F-0E91-4912-A721-AAA505D0F553}" dt="2022-04-18T15:14:46.012" v="5026" actId="20577"/>
+      <pc:chgData name="Navesh Kumar" userId="3ebf9d26fca90b3a" providerId="LiveId" clId="{4C3D355F-0E91-4912-A721-AAA505D0F553}" dt="2022-04-18T15:29:46.316" v="5029" actId="20577"/>
       <pc:docMkLst>
         <pc:docMk/>
       </pc:docMkLst>
@@ -611,7 +611,7 @@
         </pc:graphicFrameChg>
       </pc:sldChg>
       <pc:sldChg chg="addSp delSp modSp new mod modClrScheme chgLayout">
-        <pc:chgData name="Navesh Kumar" userId="3ebf9d26fca90b3a" providerId="LiveId" clId="{4C3D355F-0E91-4912-A721-AAA505D0F553}" dt="2022-04-18T14:56:25.563" v="4992" actId="20577"/>
+        <pc:chgData name="Navesh Kumar" userId="3ebf9d26fca90b3a" providerId="LiveId" clId="{4C3D355F-0E91-4912-A721-AAA505D0F553}" dt="2022-04-18T15:29:46.316" v="5029" actId="20577"/>
         <pc:sldMkLst>
           <pc:docMk/>
           <pc:sldMk cId="3922567028" sldId="261"/>
@@ -657,7 +657,7 @@
           </ac:spMkLst>
         </pc:spChg>
         <pc:spChg chg="add mod">
-          <ac:chgData name="Navesh Kumar" userId="3ebf9d26fca90b3a" providerId="LiveId" clId="{4C3D355F-0E91-4912-A721-AAA505D0F553}" dt="2022-04-18T14:56:25.563" v="4992" actId="20577"/>
+          <ac:chgData name="Navesh Kumar" userId="3ebf9d26fca90b3a" providerId="LiveId" clId="{4C3D355F-0E91-4912-A721-AAA505D0F553}" dt="2022-04-18T15:29:46.316" v="5029" actId="20577"/>
           <ac:spMkLst>
             <pc:docMk/>
             <pc:sldMk cId="3922567028" sldId="261"/>
@@ -19194,7 +19194,7 @@
             <a:pPr algn="ctr"/>
             <a:r>
               <a:rPr lang="en-IN" b="1" u="sng" dirty="0"/>
-              <a:t>INVALID NEIGHBORS</a:t>
+              <a:t>INVALID NEIGHBOURS</a:t>
             </a:r>
             <a:br>
               <a:rPr lang="en-IN" dirty="0"/>

</xml_diff>